<commit_message>
Update Session 32 - Design Patterns and Best Practices with Power BI Embedding.pptx
</commit_message>
<xml_diff>
--- a/Session 32 - Design Patterns and Best Practices with Power BI Embedding.pptx
+++ b/Session 32 - Design Patterns and Best Practices with Power BI Embedding.pptx
@@ -35,7 +35,7 @@
     <p:sldId id="4484" r:id="rId26"/>
     <p:sldId id="4504" r:id="rId27"/>
     <p:sldId id="321" r:id="rId28"/>
-    <p:sldId id="323" r:id="rId29"/>
+    <p:sldId id="2147468701" r:id="rId29"/>
     <p:sldId id="2076138741" r:id="rId30"/>
     <p:sldId id="2147468678" r:id="rId31"/>
     <p:sldId id="2147468696" r:id="rId32"/>
@@ -508,7 +508,7 @@
           <a:p>
             <a:fld id="{DCE60099-03E7-4FA1-8A7F-E6E6CFB0F855}" type="datetime8">
               <a:rPr lang="en-US" smtClean="0"/>
-              <a:t>3/30/2023 8:08 AM</a:t>
+              <a:t>3/30/2023 12:22 PM</a:t>
             </a:fld>
             <a:endParaRPr lang="en-US"/>
           </a:p>
@@ -15111,7 +15111,7 @@
           <p:cNvPr id="2" name="Title 1">
             <a:extLst>
               <a:ext uri="{FF2B5EF4-FFF2-40B4-BE49-F238E27FC236}">
-                <a16:creationId xmlns:a16="http://schemas.microsoft.com/office/drawing/2014/main" id="{F41B1293-1284-40FE-B38F-40BC4CA69026}"/>
+                <a16:creationId xmlns:a16="http://schemas.microsoft.com/office/drawing/2014/main" id="{410E880F-64A9-2DB5-F69D-CC406E4DF667}"/>
               </a:ext>
             </a:extLst>
           </p:cNvPr>
@@ -15129,186 +15129,50 @@
           <a:p>
             <a:r>
               <a:rPr lang="en-US" dirty="0"/>
-              <a:t>What’s been created in Power BI?</a:t>
-            </a:r>
-          </a:p>
-        </p:txBody>
-      </p:sp>
-      <p:sp>
-        <p:nvSpPr>
-          <p:cNvPr id="4" name="Text Placeholder 3">
-            <a:extLst>
-              <a:ext uri="{FF2B5EF4-FFF2-40B4-BE49-F238E27FC236}">
-                <a16:creationId xmlns:a16="http://schemas.microsoft.com/office/drawing/2014/main" id="{8A8C91D4-0E82-4211-9110-6546C0EB4A17}"/>
-              </a:ext>
-            </a:extLst>
-          </p:cNvPr>
-          <p:cNvSpPr>
-            <a:spLocks noGrp="1"/>
-          </p:cNvSpPr>
-          <p:nvPr>
-            <p:ph type="body" sz="quarter" idx="10"/>
-          </p:nvPr>
-        </p:nvSpPr>
-        <p:spPr/>
-        <p:txBody>
-          <a:bodyPr/>
-          <a:lstStyle/>
-          <a:p>
-            <a:r>
-              <a:rPr lang="en-US" dirty="0"/>
-              <a:t>You can see the workspaces created in Power BI</a:t>
-            </a:r>
-          </a:p>
-          <a:p>
-            <a:pPr lvl="1"/>
-            <a:r>
-              <a:rPr lang="en-US" dirty="0"/>
-              <a:t>There should be a Power BI workspace for each tenant that’s been created</a:t>
-            </a:r>
-          </a:p>
-          <a:p>
-            <a:pPr lvl="1"/>
-            <a:r>
-              <a:rPr lang="en-US" b="1" dirty="0" err="1">
-                <a:solidFill>
-                  <a:schemeClr val="accent2">
-                    <a:lumMod val="50000"/>
-                  </a:schemeClr>
-                </a:solidFill>
-              </a:rPr>
-              <a:t>ConfiguredBy</a:t>
-            </a:r>
-            <a:r>
-              <a:rPr lang="en-US" dirty="0"/>
-              <a:t> property of </a:t>
-            </a:r>
-            <a:r>
-              <a:rPr lang="en-US" b="1" dirty="0">
-                <a:solidFill>
-                  <a:schemeClr val="accent2">
-                    <a:lumMod val="50000"/>
-                  </a:schemeClr>
-                </a:solidFill>
-              </a:rPr>
-              <a:t>Sales</a:t>
-            </a:r>
-            <a:r>
-              <a:rPr lang="en-US" dirty="0"/>
-              <a:t> dataset should be set to </a:t>
-            </a:r>
-            <a:r>
-              <a:rPr lang="en-US" b="1" dirty="0">
-                <a:solidFill>
-                  <a:schemeClr val="accent2">
-                    <a:lumMod val="50000"/>
-                  </a:schemeClr>
-                </a:solidFill>
-              </a:rPr>
-              <a:t>App-Owns-Data Service App</a:t>
-            </a:r>
-          </a:p>
-          <a:p>
-            <a:pPr lvl="1"/>
-            <a:r>
-              <a:rPr lang="en-US" b="1" dirty="0">
-                <a:solidFill>
-                  <a:schemeClr val="accent2">
-                    <a:lumMod val="50000"/>
-                  </a:schemeClr>
-                </a:solidFill>
-              </a:rPr>
-              <a:t>Last refresh</a:t>
-            </a:r>
-            <a:r>
-              <a:rPr lang="en-US" dirty="0"/>
-              <a:t> time should reflect refresh operation at end of onboarding process</a:t>
+              <a:t>Updating Dataset Parameters using Power BI .NET SDK</a:t>
             </a:r>
           </a:p>
         </p:txBody>
       </p:sp>
       <p:pic>
         <p:nvPicPr>
-          <p:cNvPr id="5" name="Picture 4">
+          <p:cNvPr id="4" name="Picture 3">
             <a:extLst>
               <a:ext uri="{FF2B5EF4-FFF2-40B4-BE49-F238E27FC236}">
-                <a16:creationId xmlns:a16="http://schemas.microsoft.com/office/drawing/2014/main" id="{6DF5DCED-9743-4A00-9D0E-61B0A023A41F}"/>
+                <a16:creationId xmlns:a16="http://schemas.microsoft.com/office/drawing/2014/main" id="{22728106-867A-39D0-3D61-DC637AE40919}"/>
               </a:ext>
             </a:extLst>
           </p:cNvPr>
-          <p:cNvPicPr/>
+          <p:cNvPicPr>
+            <a:picLocks noChangeAspect="1"/>
+          </p:cNvPicPr>
           <p:nvPr/>
         </p:nvPicPr>
         <p:blipFill>
-          <a:blip r:embed="rId2" cstate="print">
-            <a:extLst>
-              <a:ext uri="{28A0092B-C50C-407E-A947-70E740481C1C}">
-                <a14:useLocalDpi xmlns:a14="http://schemas.microsoft.com/office/drawing/2010/main" val="0"/>
-              </a:ext>
-            </a:extLst>
-          </a:blip>
-          <a:srcRect/>
+          <a:blip r:embed="rId2"/>
           <a:stretch>
             <a:fillRect/>
           </a:stretch>
         </p:blipFill>
-        <p:spPr bwMode="auto">
+        <p:spPr>
           <a:xfrm>
-            <a:off x="1115038" y="3157105"/>
-            <a:ext cx="3477587" cy="3388880"/>
+            <a:off x="469572" y="1294196"/>
+            <a:ext cx="9458325" cy="2619375"/>
           </a:xfrm>
           <a:prstGeom prst="rect">
             <a:avLst/>
           </a:prstGeom>
-          <a:noFill/>
           <a:ln>
-            <a:noFill/>
-          </a:ln>
-        </p:spPr>
-      </p:pic>
-      <p:pic>
-        <p:nvPicPr>
-          <p:cNvPr id="6" name="Picture 5">
-            <a:extLst>
-              <a:ext uri="{FF2B5EF4-FFF2-40B4-BE49-F238E27FC236}">
-                <a16:creationId xmlns:a16="http://schemas.microsoft.com/office/drawing/2014/main" id="{46A5A79B-402B-4135-824D-5B0CA5BA74EB}"/>
-              </a:ext>
-            </a:extLst>
-          </p:cNvPr>
-          <p:cNvPicPr/>
-          <p:nvPr/>
-        </p:nvPicPr>
-        <p:blipFill>
-          <a:blip r:embed="rId3" cstate="print">
-            <a:extLst>
-              <a:ext uri="{28A0092B-C50C-407E-A947-70E740481C1C}">
-                <a14:useLocalDpi xmlns:a14="http://schemas.microsoft.com/office/drawing/2010/main" val="0"/>
-              </a:ext>
-            </a:extLst>
-          </a:blip>
-          <a:srcRect/>
-          <a:stretch>
-            <a:fillRect/>
-          </a:stretch>
-        </p:blipFill>
-        <p:spPr bwMode="auto">
-          <a:xfrm>
-            <a:off x="4864797" y="3186924"/>
-            <a:ext cx="7131725" cy="2137938"/>
-          </a:xfrm>
-          <a:prstGeom prst="rect">
-            <a:avLst/>
-          </a:prstGeom>
-          <a:noFill/>
-          <a:ln>
-            <a:noFill/>
+            <a:solidFill>
+              <a:schemeClr val="tx1"/>
+            </a:solidFill>
           </a:ln>
         </p:spPr>
       </p:pic>
     </p:spTree>
     <p:extLst>
       <p:ext uri="{BB962C8B-B14F-4D97-AF65-F5344CB8AC3E}">
-        <p14:creationId xmlns:p14="http://schemas.microsoft.com/office/powerpoint/2010/main" val="2259436706"/>
+        <p14:creationId xmlns:p14="http://schemas.microsoft.com/office/powerpoint/2010/main" val="3500362608"/>
       </p:ext>
     </p:extLst>
   </p:cSld>
@@ -15318,81 +15182,6 @@
   <p:transition>
     <p:fade/>
   </p:transition>
-  <p:timing>
-    <p:tnLst>
-      <p:par>
-        <p:cTn id="1" dur="indefinite" restart="never" nodeType="tmRoot">
-          <p:childTnLst>
-            <p:seq concurrent="1" nextAc="seek">
-              <p:cTn id="2" dur="indefinite" nodeType="mainSeq">
-                <p:childTnLst>
-                  <p:par>
-                    <p:cTn id="3" fill="hold">
-                      <p:stCondLst>
-                        <p:cond delay="indefinite"/>
-                      </p:stCondLst>
-                      <p:childTnLst>
-                        <p:par>
-                          <p:cTn id="4" fill="hold">
-                            <p:stCondLst>
-                              <p:cond delay="0"/>
-                            </p:stCondLst>
-                            <p:childTnLst>
-                              <p:par>
-                                <p:cTn id="5" presetID="1" presetClass="entr" presetSubtype="0" fill="hold" nodeType="clickEffect">
-                                  <p:stCondLst>
-                                    <p:cond delay="0"/>
-                                  </p:stCondLst>
-                                  <p:childTnLst>
-                                    <p:set>
-                                      <p:cBhvr>
-                                        <p:cTn id="6" dur="1" fill="hold">
-                                          <p:stCondLst>
-                                            <p:cond delay="0"/>
-                                          </p:stCondLst>
-                                        </p:cTn>
-                                        <p:tgtEl>
-                                          <p:spTgt spid="6"/>
-                                        </p:tgtEl>
-                                        <p:attrNameLst>
-                                          <p:attrName>style.visibility</p:attrName>
-                                        </p:attrNameLst>
-                                      </p:cBhvr>
-                                      <p:to>
-                                        <p:strVal val="visible"/>
-                                      </p:to>
-                                    </p:set>
-                                  </p:childTnLst>
-                                </p:cTn>
-                              </p:par>
-                            </p:childTnLst>
-                          </p:cTn>
-                        </p:par>
-                      </p:childTnLst>
-                    </p:cTn>
-                  </p:par>
-                </p:childTnLst>
-              </p:cTn>
-              <p:prevCondLst>
-                <p:cond evt="onPrev" delay="0">
-                  <p:tgtEl>
-                    <p:sldTgt/>
-                  </p:tgtEl>
-                </p:cond>
-              </p:prevCondLst>
-              <p:nextCondLst>
-                <p:cond evt="onNext" delay="0">
-                  <p:tgtEl>
-                    <p:sldTgt/>
-                  </p:tgtEl>
-                </p:cond>
-              </p:nextCondLst>
-            </p:seq>
-          </p:childTnLst>
-        </p:cTn>
-      </p:par>
-    </p:tnLst>
-  </p:timing>
 </p:sld>
 </file>
 
@@ -26624,6 +26413,33 @@
                                   </p:childTnLst>
                                 </p:cTn>
                               </p:par>
+                              <p:par>
+                                <p:cTn id="7" presetID="1" presetClass="entr" presetSubtype="0" fill="hold" nodeType="withEffect">
+                                  <p:stCondLst>
+                                    <p:cond delay="0"/>
+                                  </p:stCondLst>
+                                  <p:childTnLst>
+                                    <p:set>
+                                      <p:cBhvr>
+                                        <p:cTn id="8" dur="1" fill="hold">
+                                          <p:stCondLst>
+                                            <p:cond delay="0"/>
+                                          </p:stCondLst>
+                                        </p:cTn>
+                                        <p:tgtEl>
+                                          <p:spTgt spid="9"/>
+                                        </p:tgtEl>
+                                        <p:attrNameLst>
+                                          <p:attrName>style.visibility</p:attrName>
+                                        </p:attrNameLst>
+                                      </p:cBhvr>
+                                      <p:to>
+                                        <p:strVal val="visible"/>
+                                      </p:to>
+                                    </p:set>
+                                  </p:childTnLst>
+                                </p:cTn>
+                              </p:par>
                             </p:childTnLst>
                           </p:cTn>
                         </p:par>
@@ -27401,6 +27217,33 @@
                                   </p:childTnLst>
                                 </p:cTn>
                               </p:par>
+                              <p:par>
+                                <p:cTn id="7" presetID="1" presetClass="entr" presetSubtype="0" fill="hold" nodeType="withEffect">
+                                  <p:stCondLst>
+                                    <p:cond delay="0"/>
+                                  </p:stCondLst>
+                                  <p:childTnLst>
+                                    <p:set>
+                                      <p:cBhvr>
+                                        <p:cTn id="8" dur="1" fill="hold">
+                                          <p:stCondLst>
+                                            <p:cond delay="0"/>
+                                          </p:stCondLst>
+                                        </p:cTn>
+                                        <p:tgtEl>
+                                          <p:spTgt spid="8"/>
+                                        </p:tgtEl>
+                                        <p:attrNameLst>
+                                          <p:attrName>style.visibility</p:attrName>
+                                        </p:attrNameLst>
+                                      </p:cBhvr>
+                                      <p:to>
+                                        <p:strVal val="visible"/>
+                                      </p:to>
+                                    </p:set>
+                                  </p:childTnLst>
+                                </p:cTn>
+                              </p:par>
                             </p:childTnLst>
                           </p:cTn>
                         </p:par>
@@ -27408,26 +27251,26 @@
                     </p:cTn>
                   </p:par>
                   <p:par>
-                    <p:cTn id="7" fill="hold">
+                    <p:cTn id="9" fill="hold">
                       <p:stCondLst>
                         <p:cond delay="indefinite"/>
                       </p:stCondLst>
                       <p:childTnLst>
                         <p:par>
-                          <p:cTn id="8" fill="hold">
+                          <p:cTn id="10" fill="hold">
                             <p:stCondLst>
                               <p:cond delay="0"/>
                             </p:stCondLst>
                             <p:childTnLst>
                               <p:par>
-                                <p:cTn id="9" presetID="1" presetClass="entr" presetSubtype="0" fill="hold" nodeType="clickEffect">
+                                <p:cTn id="11" presetID="1" presetClass="entr" presetSubtype="0" fill="hold" nodeType="clickEffect">
                                   <p:stCondLst>
                                     <p:cond delay="0"/>
                                   </p:stCondLst>
                                   <p:childTnLst>
                                     <p:set>
                                       <p:cBhvr>
-                                        <p:cTn id="10" dur="1" fill="hold">
+                                        <p:cTn id="12" dur="1" fill="hold">
                                           <p:stCondLst>
                                             <p:cond delay="0"/>
                                           </p:stCondLst>
@@ -28584,7 +28427,7 @@
         <p:spPr>
           <a:xfrm>
             <a:off x="511277" y="1227439"/>
-            <a:ext cx="11604521" cy="1138773"/>
+            <a:ext cx="11604521" cy="1523494"/>
           </a:xfrm>
         </p:spPr>
         <p:txBody>
@@ -28612,15 +28455,19 @@
             <a:pPr lvl="1"/>
             <a:r>
               <a:rPr lang="en-US" dirty="0"/>
+              <a:t>Called whenever a new report is created</a:t>
+            </a:r>
+          </a:p>
+          <a:p>
+            <a:pPr lvl="1"/>
+            <a:r>
+              <a:rPr lang="en-US" dirty="0"/>
               <a:t>Called to prevent embed token from expiring</a:t>
             </a:r>
           </a:p>
           <a:p>
             <a:pPr lvl="1"/>
-            <a:r>
-              <a:rPr lang="en-US" dirty="0"/>
-              <a:t>Called whenever a new report Is created</a:t>
-            </a:r>
+            <a:endParaRPr lang="en-US" dirty="0"/>
           </a:p>
         </p:txBody>
       </p:sp>
@@ -29418,7 +29265,7 @@
             <a:pPr lvl="1"/>
             <a:r>
               <a:rPr lang="en-US" dirty="0"/>
-              <a:t>RLS can be added so users in same customer tenant varying permissions levels</a:t>
+              <a:t>RLS rules added if users in same customer tenant must vary in permissions levels</a:t>
             </a:r>
           </a:p>
         </p:txBody>
@@ -29546,7 +29393,7 @@
         </p:blipFill>
         <p:spPr>
           <a:xfrm>
-            <a:off x="7612172" y="1247556"/>
+            <a:off x="7633193" y="1171376"/>
             <a:ext cx="3580101" cy="3587204"/>
           </a:xfrm>
           <a:prstGeom prst="rect">
@@ -34273,7 +34120,7 @@
             </a:r>
             <a:r>
               <a:rPr lang="en-US" b="1" dirty="0"/>
-              <a:t>Embed for your customers</a:t>
+              <a:t>Embed for your Organization</a:t>
             </a:r>
           </a:p>
         </p:txBody>
@@ -39088,8 +38935,44 @@
           <a:p>
             <a:pPr lvl="1"/>
             <a:r>
-              <a:rPr lang="en-US" dirty="0"/>
-              <a:t>Don’t confuse this use of term “tenant” with an Azure AD tenant – they are completely different</a:t>
+              <a:rPr lang="en-US" dirty="0">
+                <a:solidFill>
+                  <a:srgbClr val="920000"/>
+                </a:solidFill>
+              </a:rPr>
+              <a:t>Don’t confuse this use of term </a:t>
+            </a:r>
+            <a:r>
+              <a:rPr lang="en-US" b="1" dirty="0">
+                <a:solidFill>
+                  <a:srgbClr val="920000"/>
+                </a:solidFill>
+              </a:rPr>
+              <a:t>“tenant”</a:t>
+            </a:r>
+            <a:r>
+              <a:rPr lang="en-US" dirty="0">
+                <a:solidFill>
+                  <a:srgbClr val="920000"/>
+                </a:solidFill>
+              </a:rPr>
+              <a:t> with </a:t>
+            </a:r>
+            <a:r>
+              <a:rPr lang="en-US" b="1" dirty="0">
+                <a:solidFill>
+                  <a:srgbClr val="920000"/>
+                </a:solidFill>
+              </a:rPr>
+              <a:t>Azure AD tenant</a:t>
+            </a:r>
+            <a:r>
+              <a:rPr lang="en-US" dirty="0">
+                <a:solidFill>
+                  <a:srgbClr val="920000"/>
+                </a:solidFill>
+              </a:rPr>
+              <a:t> – they are completely different</a:t>
             </a:r>
           </a:p>
         </p:txBody>
@@ -39827,6 +39710,85 @@
   <p:transition>
     <p:fade/>
   </p:transition>
+  <p:timing>
+    <p:tnLst>
+      <p:par>
+        <p:cTn id="1" dur="indefinite" restart="never" nodeType="tmRoot">
+          <p:childTnLst>
+            <p:seq concurrent="1" nextAc="seek">
+              <p:cTn id="2" dur="indefinite" nodeType="mainSeq">
+                <p:childTnLst>
+                  <p:par>
+                    <p:cTn id="3" fill="hold">
+                      <p:stCondLst>
+                        <p:cond delay="indefinite"/>
+                      </p:stCondLst>
+                      <p:childTnLst>
+                        <p:par>
+                          <p:cTn id="4" fill="hold">
+                            <p:stCondLst>
+                              <p:cond delay="0"/>
+                            </p:stCondLst>
+                            <p:childTnLst>
+                              <p:par>
+                                <p:cTn id="5" presetID="1" presetClass="entr" presetSubtype="0" fill="hold" nodeType="clickEffect">
+                                  <p:stCondLst>
+                                    <p:cond delay="0"/>
+                                  </p:stCondLst>
+                                  <p:childTnLst>
+                                    <p:set>
+                                      <p:cBhvr>
+                                        <p:cTn id="6" dur="1" fill="hold">
+                                          <p:stCondLst>
+                                            <p:cond delay="0"/>
+                                          </p:stCondLst>
+                                        </p:cTn>
+                                        <p:tgtEl>
+                                          <p:spTgt spid="3">
+                                            <p:txEl>
+                                              <p:pRg st="2" end="2"/>
+                                            </p:txEl>
+                                          </p:spTgt>
+                                        </p:tgtEl>
+                                        <p:attrNameLst>
+                                          <p:attrName>style.visibility</p:attrName>
+                                        </p:attrNameLst>
+                                      </p:cBhvr>
+                                      <p:to>
+                                        <p:strVal val="visible"/>
+                                      </p:to>
+                                    </p:set>
+                                  </p:childTnLst>
+                                </p:cTn>
+                              </p:par>
+                            </p:childTnLst>
+                          </p:cTn>
+                        </p:par>
+                      </p:childTnLst>
+                    </p:cTn>
+                  </p:par>
+                </p:childTnLst>
+              </p:cTn>
+              <p:prevCondLst>
+                <p:cond evt="onPrev" delay="0">
+                  <p:tgtEl>
+                    <p:sldTgt/>
+                  </p:tgtEl>
+                </p:cond>
+              </p:prevCondLst>
+              <p:nextCondLst>
+                <p:cond evt="onNext" delay="0">
+                  <p:tgtEl>
+                    <p:sldTgt/>
+                  </p:tgtEl>
+                </p:cond>
+              </p:nextCondLst>
+            </p:seq>
+          </p:childTnLst>
+        </p:cTn>
+      </p:par>
+    </p:tnLst>
+  </p:timing>
 </p:sld>
 </file>
 
@@ -40699,12 +40661,6 @@
 </file>
 
 <file path=customXml/item1.xml><?xml version="1.0" encoding="utf-8"?>
-<p:properties xmlns:p="http://schemas.microsoft.com/office/2006/metadata/properties" xmlns:xsi="http://www.w3.org/2001/XMLSchema-instance" xmlns:pc="http://schemas.microsoft.com/office/infopath/2007/PartnerControls">
-  <documentManagement/>
-</p:properties>
-</file>
-
-<file path=customXml/item2.xml><?xml version="1.0" encoding="utf-8"?>
 <ct:contentTypeSchema xmlns:ct="http://schemas.microsoft.com/office/2006/metadata/contentType" xmlns:ma="http://schemas.microsoft.com/office/2006/metadata/properties/metaAttributes" ct:_="" ma:_="" ma:contentTypeName="Document" ma:contentTypeID="0x0101000937CBA2829AB54C847AA138BDB6DD62" ma:contentTypeVersion="6" ma:contentTypeDescription="Create a new document." ma:contentTypeScope="" ma:versionID="0f7e39fa3406a6f330081ac46f53a9d2">
   <xsd:schema xmlns:xsd="http://www.w3.org/2001/XMLSchema" xmlns:xs="http://www.w3.org/2001/XMLSchema" xmlns:p="http://schemas.microsoft.com/office/2006/metadata/properties" xmlns:ns2="ef38329b-e139-4eb4-9d7a-1b84c79a6610" targetNamespace="http://schemas.microsoft.com/office/2006/metadata/properties" ma:root="true" ma:fieldsID="c5e10262f8d934c139771ac03f38712c" ns2:_="">
     <xsd:import namespace="ef38329b-e139-4eb4-9d7a-1b84c79a6610"/>
@@ -40856,7 +40812,7 @@
 </ct:contentTypeSchema>
 </file>
 
-<file path=customXml/item3.xml><?xml version="1.0" encoding="utf-8"?>
+<file path=customXml/item2.xml><?xml version="1.0" encoding="utf-8"?>
 <?mso-contentType ?>
 <FormTemplates xmlns="http://schemas.microsoft.com/sharepoint/v3/contenttype/forms">
   <Display>DocumentLibraryForm</Display>
@@ -40865,23 +40821,13 @@
 </FormTemplates>
 </file>
 
-<file path=customXml/itemProps1.xml><?xml version="1.0" encoding="utf-8"?>
-<ds:datastoreItem xmlns:ds="http://schemas.openxmlformats.org/officeDocument/2006/customXml" ds:itemID="{F990F116-B58F-4255-B05B-DA3808E0E5C6}">
-  <ds:schemaRefs>
-    <ds:schemaRef ds:uri="http://schemas.openxmlformats.org/package/2006/metadata/core-properties"/>
-    <ds:schemaRef ds:uri="http://schemas.microsoft.com/office/infopath/2007/PartnerControls"/>
-    <ds:schemaRef ds:uri="http://purl.org/dc/dcmitype/"/>
-    <ds:schemaRef ds:uri="http://schemas.microsoft.com/office/2006/documentManagement/types"/>
-    <ds:schemaRef ds:uri="http://www.w3.org/XML/1998/namespace"/>
-    <ds:schemaRef ds:uri="http://schemas.microsoft.com/office/2006/metadata/properties"/>
-    <ds:schemaRef ds:uri="http://purl.org/dc/terms/"/>
-    <ds:schemaRef ds:uri="http://purl.org/dc/elements/1.1/"/>
-    <ds:schemaRef ds:uri="ef38329b-e139-4eb4-9d7a-1b84c79a6610"/>
-  </ds:schemaRefs>
-</ds:datastoreItem>
+<file path=customXml/item3.xml><?xml version="1.0" encoding="utf-8"?>
+<p:properties xmlns:p="http://schemas.microsoft.com/office/2006/metadata/properties" xmlns:xsi="http://www.w3.org/2001/XMLSchema-instance" xmlns:pc="http://schemas.microsoft.com/office/infopath/2007/PartnerControls">
+  <documentManagement/>
+</p:properties>
 </file>
 
-<file path=customXml/itemProps2.xml><?xml version="1.0" encoding="utf-8"?>
+<file path=customXml/itemProps1.xml><?xml version="1.0" encoding="utf-8"?>
 <ds:datastoreItem xmlns:ds="http://schemas.openxmlformats.org/officeDocument/2006/customXml" ds:itemID="{A4052A8C-2220-4E4B-95E2-C05C9863F10E}">
   <ds:schemaRefs>
     <ds:schemaRef ds:uri="ef38329b-e139-4eb4-9d7a-1b84c79a6610"/>
@@ -40899,10 +40845,26 @@
 </ds:datastoreItem>
 </file>
 
-<file path=customXml/itemProps3.xml><?xml version="1.0" encoding="utf-8"?>
+<file path=customXml/itemProps2.xml><?xml version="1.0" encoding="utf-8"?>
 <ds:datastoreItem xmlns:ds="http://schemas.openxmlformats.org/officeDocument/2006/customXml" ds:itemID="{758FDAC0-319D-4A54-8D8E-1D42CB1F8004}">
   <ds:schemaRefs>
     <ds:schemaRef ds:uri="http://schemas.microsoft.com/sharepoint/v3/contenttype/forms"/>
+  </ds:schemaRefs>
+</ds:datastoreItem>
+</file>
+
+<file path=customXml/itemProps3.xml><?xml version="1.0" encoding="utf-8"?>
+<ds:datastoreItem xmlns:ds="http://schemas.openxmlformats.org/officeDocument/2006/customXml" ds:itemID="{F990F116-B58F-4255-B05B-DA3808E0E5C6}">
+  <ds:schemaRefs>
+    <ds:schemaRef ds:uri="http://schemas.microsoft.com/office/2006/documentManagement/types"/>
+    <ds:schemaRef ds:uri="http://www.w3.org/XML/1998/namespace"/>
+    <ds:schemaRef ds:uri="http://purl.org/dc/elements/1.1/"/>
+    <ds:schemaRef ds:uri="http://purl.org/dc/dcmitype/"/>
+    <ds:schemaRef ds:uri="ef38329b-e139-4eb4-9d7a-1b84c79a6610"/>
+    <ds:schemaRef ds:uri="http://schemas.microsoft.com/office/2006/metadata/properties"/>
+    <ds:schemaRef ds:uri="http://schemas.microsoft.com/office/infopath/2007/PartnerControls"/>
+    <ds:schemaRef ds:uri="http://schemas.openxmlformats.org/package/2006/metadata/core-properties"/>
+    <ds:schemaRef ds:uri="http://purl.org/dc/terms/"/>
   </ds:schemaRefs>
 </ds:datastoreItem>
 </file>

</xml_diff>